<commit_message>
Changed some titles on the slides
</commit_message>
<xml_diff>
--- a/GamePresentation1.pptx
+++ b/GamePresentation1.pptx
@@ -771,7 +771,7 @@
             <a:fld id="{E5869BE3-3D7A-439E-8330-CB40785C6D07}" type="datetimeFigureOut">
               <a:rPr lang="en-US" smtClean="0"/>
               <a:pPr/>
-              <a:t>1/29/2012</a:t>
+              <a:t>1/30/2012</a:t>
             </a:fld>
             <a:endParaRPr lang="en-US"/>
           </a:p>
@@ -956,7 +956,7 @@
             <a:fld id="{E5869BE3-3D7A-439E-8330-CB40785C6D07}" type="datetimeFigureOut">
               <a:rPr lang="en-US" smtClean="0"/>
               <a:pPr/>
-              <a:t>1/29/2012</a:t>
+              <a:t>1/30/2012</a:t>
             </a:fld>
             <a:endParaRPr lang="en-US"/>
           </a:p>
@@ -1133,7 +1133,7 @@
             <a:fld id="{E5869BE3-3D7A-439E-8330-CB40785C6D07}" type="datetimeFigureOut">
               <a:rPr lang="en-US" smtClean="0"/>
               <a:pPr/>
-              <a:t>1/29/2012</a:t>
+              <a:t>1/30/2012</a:t>
             </a:fld>
             <a:endParaRPr lang="en-US"/>
           </a:p>
@@ -1300,7 +1300,7 @@
             <a:fld id="{E5869BE3-3D7A-439E-8330-CB40785C6D07}" type="datetimeFigureOut">
               <a:rPr lang="en-US" smtClean="0"/>
               <a:pPr/>
-              <a:t>1/29/2012</a:t>
+              <a:t>1/30/2012</a:t>
             </a:fld>
             <a:endParaRPr lang="en-US"/>
           </a:p>
@@ -1523,7 +1523,7 @@
             <a:fld id="{E5869BE3-3D7A-439E-8330-CB40785C6D07}" type="datetimeFigureOut">
               <a:rPr lang="en-US" smtClean="0"/>
               <a:pPr/>
-              <a:t>1/29/2012</a:t>
+              <a:t>1/30/2012</a:t>
             </a:fld>
             <a:endParaRPr lang="en-US"/>
           </a:p>
@@ -1784,7 +1784,7 @@
             <a:fld id="{E5869BE3-3D7A-439E-8330-CB40785C6D07}" type="datetimeFigureOut">
               <a:rPr lang="en-US" smtClean="0"/>
               <a:pPr/>
-              <a:t>1/29/2012</a:t>
+              <a:t>1/30/2012</a:t>
             </a:fld>
             <a:endParaRPr lang="en-US"/>
           </a:p>
@@ -2190,7 +2190,7 @@
             <a:fld id="{E5869BE3-3D7A-439E-8330-CB40785C6D07}" type="datetimeFigureOut">
               <a:rPr lang="en-US" smtClean="0"/>
               <a:pPr/>
-              <a:t>1/29/2012</a:t>
+              <a:t>1/30/2012</a:t>
             </a:fld>
             <a:endParaRPr lang="en-US"/>
           </a:p>
@@ -2323,7 +2323,7 @@
             <a:fld id="{E5869BE3-3D7A-439E-8330-CB40785C6D07}" type="datetimeFigureOut">
               <a:rPr lang="en-US" smtClean="0"/>
               <a:pPr/>
-              <a:t>1/29/2012</a:t>
+              <a:t>1/30/2012</a:t>
             </a:fld>
             <a:endParaRPr lang="en-US"/>
           </a:p>
@@ -2425,7 +2425,7 @@
             <a:fld id="{E5869BE3-3D7A-439E-8330-CB40785C6D07}" type="datetimeFigureOut">
               <a:rPr lang="en-US" smtClean="0"/>
               <a:pPr/>
-              <a:t>1/29/2012</a:t>
+              <a:t>1/30/2012</a:t>
             </a:fld>
             <a:endParaRPr lang="en-US"/>
           </a:p>
@@ -2672,7 +2672,7 @@
             <a:fld id="{E5869BE3-3D7A-439E-8330-CB40785C6D07}" type="datetimeFigureOut">
               <a:rPr lang="en-US" smtClean="0"/>
               <a:pPr/>
-              <a:t>1/29/2012</a:t>
+              <a:t>1/30/2012</a:t>
             </a:fld>
             <a:endParaRPr lang="en-US"/>
           </a:p>
@@ -2918,7 +2918,7 @@
             <a:fld id="{E5869BE3-3D7A-439E-8330-CB40785C6D07}" type="datetimeFigureOut">
               <a:rPr lang="en-US" smtClean="0"/>
               <a:pPr/>
-              <a:t>1/29/2012</a:t>
+              <a:t>1/30/2012</a:t>
             </a:fld>
             <a:endParaRPr lang="en-US"/>
           </a:p>
@@ -3744,7 +3744,7 @@
             <a:fld id="{E5869BE3-3D7A-439E-8330-CB40785C6D07}" type="datetimeFigureOut">
               <a:rPr lang="en-US" smtClean="0"/>
               <a:pPr/>
-              <a:t>1/29/2012</a:t>
+              <a:t>1/30/2012</a:t>
             </a:fld>
             <a:endParaRPr lang="en-US"/>
           </a:p>
@@ -4150,7 +4150,19 @@
           <a:bodyPr/>
           <a:lstStyle/>
           <a:p>
-            <a:endParaRPr lang="en-US" dirty="0"/>
+            <a:r>
+              <a:rPr lang="en-US" dirty="0" err="1" smtClean="0"/>
+              <a:t>Platforming</a:t>
+            </a:r>
+            <a:r>
+              <a:rPr lang="en-US" dirty="0" smtClean="0"/>
+              <a:t> Game</a:t>
+            </a:r>
+            <a:r>
+              <a:rPr lang="en-US" sz="3000" dirty="0" smtClean="0"/>
+              <a:t>(working title)</a:t>
+            </a:r>
+            <a:endParaRPr lang="en-US" sz="3000" dirty="0"/>
           </a:p>
         </p:txBody>
       </p:sp>
@@ -4331,7 +4343,7 @@
           <a:p>
             <a:r>
               <a:rPr lang="en-US" dirty="0" smtClean="0"/>
-              <a:t>Platform/Language/Toolkits</a:t>
+              <a:t>Platform/Language</a:t>
             </a:r>
             <a:endParaRPr lang="en-US" dirty="0"/>
           </a:p>
@@ -4418,11 +4430,7 @@
           <a:p>
             <a:r>
               <a:rPr lang="en-US" dirty="0" smtClean="0"/>
-              <a:t>First Release Use </a:t>
-            </a:r>
-            <a:r>
-              <a:rPr lang="en-US" dirty="0" smtClean="0"/>
-              <a:t>Case</a:t>
+              <a:t>First Release Use Case</a:t>
             </a:r>
             <a:endParaRPr lang="en-US" dirty="0"/>
           </a:p>
@@ -4518,12 +4526,14 @@
         </p:nvSpPr>
         <p:spPr/>
         <p:txBody>
-          <a:bodyPr/>
+          <a:bodyPr>
+            <a:normAutofit/>
+          </a:bodyPr>
           <a:lstStyle/>
           <a:p>
             <a:r>
               <a:rPr lang="en-US" dirty="0" smtClean="0"/>
-              <a:t>Tasks/Developers/Est. Time</a:t>
+              <a:t>Tasks</a:t>
             </a:r>
             <a:endParaRPr lang="en-US" dirty="0"/>
           </a:p>
@@ -4562,7 +4572,6 @@
               <a:rPr lang="en-US" dirty="0" smtClean="0"/>
               <a:t>Developers: Denis and J.P.</a:t>
             </a:r>
-            <a:endParaRPr lang="en-US" dirty="0" smtClean="0"/>
           </a:p>
           <a:p>
             <a:r>
@@ -4710,7 +4719,6 @@
               <a:rPr lang="en-US" dirty="0" smtClean="0"/>
               <a:t>Meeting to write use case, create tasks, and assign developers</a:t>
             </a:r>
-            <a:endParaRPr lang="en-US" dirty="0" smtClean="0"/>
           </a:p>
           <a:p>
             <a:pPr lvl="1"/>

</xml_diff>